<commit_message>
Add `Font.IsBold` property (#119)
Add `Font.IsBold` property
</commit_message>
<xml_diff>
--- a/ShapeCrawler.Tests.Unit/Resource/020.pptx
+++ b/ShapeCrawler.Tests.Unit/Resource/020.pptx
@@ -5,13 +5,15 @@
     <p:sldMasterId id="2147483660" r:id="rId1"/>
   </p:sldMasterIdLst>
   <p:notesMasterIdLst>
-    <p:notesMasterId r:id="rId3"/>
+    <p:notesMasterId r:id="rId5"/>
   </p:notesMasterIdLst>
   <p:handoutMasterIdLst>
-    <p:handoutMasterId r:id="rId4"/>
+    <p:handoutMasterId r:id="rId6"/>
   </p:handoutMasterIdLst>
   <p:sldIdLst>
     <p:sldId id="677" r:id="rId2"/>
+    <p:sldId id="678" r:id="rId3"/>
+    <p:sldId id="679" r:id="rId4"/>
   </p:sldIdLst>
   <p:sldSz cx="9144000" cy="6858000" type="screen4x3"/>
   <p:notesSz cx="6797675" cy="9928225"/>
@@ -320,7 +322,7 @@
               <a:pPr>
                 <a:defRPr/>
               </a:pPr>
-              <a:t>22.02.2020</a:t>
+              <a:t>16.03.2021</a:t>
             </a:fld>
             <a:endParaRPr lang="ru-RU" dirty="0"/>
           </a:p>
@@ -542,7 +544,7 @@
               <a:pPr>
                 <a:defRPr/>
               </a:pPr>
-              <a:t>22.02.2020</a:t>
+              <a:t>16.03.2021</a:t>
             </a:fld>
             <a:endParaRPr lang="ru-RU" dirty="0"/>
           </a:p>
@@ -1152,6 +1154,148 @@
           </a:p>
         </p:txBody>
       </p:sp>
+      <p:sp>
+        <p:nvSpPr>
+          <p:cNvPr id="6" name="Text Placeholder 5">
+            <a:extLst>
+              <a:ext uri="{FF2B5EF4-FFF2-40B4-BE49-F238E27FC236}">
+                <a16:creationId xmlns:a16="http://schemas.microsoft.com/office/drawing/2014/main" id="{8669D043-A37F-4782-8097-9421E20D780C}"/>
+              </a:ext>
+            </a:extLst>
+          </p:cNvPr>
+          <p:cNvSpPr>
+            <a:spLocks noGrp="1"/>
+          </p:cNvSpPr>
+          <p:nvPr>
+            <p:ph type="body" sz="quarter" idx="13"/>
+          </p:nvPr>
+        </p:nvSpPr>
+        <p:spPr>
+          <a:xfrm>
+            <a:off x="3419475" y="4545013"/>
+            <a:ext cx="2700338" cy="701675"/>
+          </a:xfrm>
+        </p:spPr>
+        <p:txBody>
+          <a:bodyPr/>
+          <a:lstStyle>
+            <a:lvl1pPr>
+              <a:defRPr b="1"/>
+            </a:lvl1pPr>
+            <a:lvl2pPr>
+              <a:defRPr b="1"/>
+            </a:lvl2pPr>
+            <a:lvl3pPr>
+              <a:defRPr b="1"/>
+            </a:lvl3pPr>
+            <a:lvl4pPr>
+              <a:defRPr b="1"/>
+            </a:lvl4pPr>
+            <a:lvl5pPr>
+              <a:defRPr b="1"/>
+            </a:lvl5pPr>
+          </a:lstStyle>
+          <a:p>
+            <a:pPr lvl="0"/>
+            <a:r>
+              <a:rPr lang="en-US" dirty="0"/>
+              <a:t>Click to edit Master text styles</a:t>
+            </a:r>
+          </a:p>
+          <a:p>
+            <a:pPr lvl="1"/>
+            <a:r>
+              <a:rPr lang="en-US" dirty="0"/>
+              <a:t>Second level</a:t>
+            </a:r>
+          </a:p>
+          <a:p>
+            <a:pPr lvl="2"/>
+            <a:r>
+              <a:rPr lang="en-US" dirty="0"/>
+              <a:t>Third level</a:t>
+            </a:r>
+          </a:p>
+          <a:p>
+            <a:pPr lvl="3"/>
+            <a:r>
+              <a:rPr lang="en-US" dirty="0"/>
+              <a:t>Fourth level</a:t>
+            </a:r>
+          </a:p>
+          <a:p>
+            <a:pPr lvl="4"/>
+            <a:r>
+              <a:rPr lang="en-US" dirty="0"/>
+              <a:t>Fifth level</a:t>
+            </a:r>
+            <a:endParaRPr lang="ru-RU" dirty="0"/>
+          </a:p>
+        </p:txBody>
+      </p:sp>
+      <p:sp>
+        <p:nvSpPr>
+          <p:cNvPr id="8" name="Text Placeholder 7">
+            <a:extLst>
+              <a:ext uri="{FF2B5EF4-FFF2-40B4-BE49-F238E27FC236}">
+                <a16:creationId xmlns:a16="http://schemas.microsoft.com/office/drawing/2014/main" id="{08098F23-4701-49E0-93EE-0459FCFFF830}"/>
+              </a:ext>
+            </a:extLst>
+          </p:cNvPr>
+          <p:cNvSpPr>
+            <a:spLocks noGrp="1"/>
+          </p:cNvSpPr>
+          <p:nvPr>
+            <p:ph type="body" sz="quarter" idx="14"/>
+          </p:nvPr>
+        </p:nvSpPr>
+        <p:spPr>
+          <a:xfrm>
+            <a:off x="863600" y="2081213"/>
+            <a:ext cx="2124075" cy="1184275"/>
+          </a:xfrm>
+        </p:spPr>
+        <p:txBody>
+          <a:bodyPr/>
+          <a:lstStyle/>
+          <a:p>
+            <a:pPr lvl="0"/>
+            <a:r>
+              <a:rPr lang="en-US" dirty="0"/>
+              <a:t>Click to edit Master text styles</a:t>
+            </a:r>
+          </a:p>
+          <a:p>
+            <a:pPr lvl="1"/>
+            <a:r>
+              <a:rPr lang="en-US" dirty="0"/>
+              <a:t>Second level</a:t>
+            </a:r>
+          </a:p>
+          <a:p>
+            <a:pPr lvl="2"/>
+            <a:r>
+              <a:rPr lang="en-US" dirty="0"/>
+              <a:t>Third level</a:t>
+            </a:r>
+          </a:p>
+          <a:p>
+            <a:pPr lvl="3"/>
+            <a:r>
+              <a:rPr lang="en-US" dirty="0"/>
+              <a:t>Fourth level</a:t>
+            </a:r>
+          </a:p>
+          <a:p>
+            <a:pPr lvl="4"/>
+            <a:r>
+              <a:rPr lang="en-US" dirty="0"/>
+              <a:t>Fifth level</a:t>
+            </a:r>
+            <a:endParaRPr lang="ru-RU" dirty="0"/>
+          </a:p>
+        </p:txBody>
+      </p:sp>
     </p:spTree>
     <p:extLst>
       <p:ext uri="{BB962C8B-B14F-4D97-AF65-F5344CB8AC3E}">
@@ -1968,14 +2112,14 @@
           <a:p>
             <a:pPr algn="ctr"/>
             <a:r>
-              <a:rPr lang="en-US" dirty="0">
+              <a:rPr lang="en-US" b="1" dirty="0">
                 <a:solidFill>
                   <a:schemeClr val="tx1"/>
                 </a:solidFill>
               </a:rPr>
               <a:t>Test</a:t>
             </a:r>
-            <a:endParaRPr lang="ru-RU" dirty="0">
+            <a:endParaRPr lang="ru-RU" b="1" dirty="0">
               <a:solidFill>
                 <a:schemeClr val="tx1"/>
               </a:solidFill>
@@ -1996,6 +2140,55 @@
                 <a:schemeClr val="tx1"/>
               </a:solidFill>
             </a:endParaRPr>
+          </a:p>
+        </p:txBody>
+      </p:sp>
+      <p:sp>
+        <p:nvSpPr>
+          <p:cNvPr id="2" name="TextBox 1">
+            <a:extLst>
+              <a:ext uri="{FF2B5EF4-FFF2-40B4-BE49-F238E27FC236}">
+                <a16:creationId xmlns:a16="http://schemas.microsoft.com/office/drawing/2014/main" id="{7C375C0A-072F-4052-9447-640547426FD0}"/>
+              </a:ext>
+            </a:extLst>
+          </p:cNvPr>
+          <p:cNvSpPr txBox="1"/>
+          <p:nvPr/>
+        </p:nvSpPr>
+        <p:spPr>
+          <a:xfrm>
+            <a:off x="4391980" y="1952836"/>
+            <a:ext cx="1296144" cy="369332"/>
+          </a:xfrm>
+          <a:prstGeom prst="rect">
+            <a:avLst/>
+          </a:prstGeom>
+        </p:spPr>
+        <p:style>
+          <a:lnRef idx="2">
+            <a:schemeClr val="dk1"/>
+          </a:lnRef>
+          <a:fillRef idx="1">
+            <a:schemeClr val="lt1"/>
+          </a:fillRef>
+          <a:effectRef idx="0">
+            <a:schemeClr val="dk1"/>
+          </a:effectRef>
+          <a:fontRef idx="minor">
+            <a:schemeClr val="dk1"/>
+          </a:fontRef>
+        </p:style>
+        <p:txBody>
+          <a:bodyPr wrap="square" rtlCol="0">
+            <a:spAutoFit/>
+          </a:bodyPr>
+          <a:lstStyle/>
+          <a:p>
+            <a:r>
+              <a:rPr lang="en-US" dirty="0"/>
+              <a:t>id2</a:t>
+            </a:r>
+            <a:endParaRPr lang="ru-RU" dirty="0"/>
           </a:p>
         </p:txBody>
       </p:sp>
@@ -2012,6 +2205,349 @@
   <p:transition spd="slow">
     <p:fade thruBlk="1"/>
   </p:transition>
+</p:sld>
+</file>
+
+<file path=ppt/slides/slide2.xml><?xml version="1.0" encoding="utf-8"?>
+<p:sld xmlns:a="http://schemas.openxmlformats.org/drawingml/2006/main" xmlns:r="http://schemas.openxmlformats.org/officeDocument/2006/relationships" xmlns:p="http://schemas.openxmlformats.org/presentationml/2006/main">
+  <p:cSld>
+    <p:spTree>
+      <p:nvGrpSpPr>
+        <p:cNvPr id="1" name=""/>
+        <p:cNvGrpSpPr/>
+        <p:nvPr/>
+      </p:nvGrpSpPr>
+      <p:grpSpPr>
+        <a:xfrm>
+          <a:off x="0" y="0"/>
+          <a:ext cx="0" cy="0"/>
+          <a:chOff x="0" y="0"/>
+          <a:chExt cx="0" cy="0"/>
+        </a:xfrm>
+      </p:grpSpPr>
+      <p:sp>
+        <p:nvSpPr>
+          <p:cNvPr id="2" name="Title 1">
+            <a:extLst>
+              <a:ext uri="{FF2B5EF4-FFF2-40B4-BE49-F238E27FC236}">
+                <a16:creationId xmlns:a16="http://schemas.microsoft.com/office/drawing/2014/main" id="{3A01B35A-841B-4F99-8C73-20345A870D83}"/>
+              </a:ext>
+            </a:extLst>
+          </p:cNvPr>
+          <p:cNvSpPr>
+            <a:spLocks noGrp="1"/>
+          </p:cNvSpPr>
+          <p:nvPr>
+            <p:ph type="ctrTitle"/>
+          </p:nvPr>
+        </p:nvSpPr>
+        <p:spPr/>
+        <p:txBody>
+          <a:bodyPr/>
+          <a:lstStyle/>
+          <a:p>
+            <a:endParaRPr lang="ru-RU"/>
+          </a:p>
+        </p:txBody>
+      </p:sp>
+      <p:sp>
+        <p:nvSpPr>
+          <p:cNvPr id="3" name="Subtitle 2">
+            <a:extLst>
+              <a:ext uri="{FF2B5EF4-FFF2-40B4-BE49-F238E27FC236}">
+                <a16:creationId xmlns:a16="http://schemas.microsoft.com/office/drawing/2014/main" id="{8E4A9364-D4C0-48D2-8CD1-67DE4DBF0F1D}"/>
+              </a:ext>
+            </a:extLst>
+          </p:cNvPr>
+          <p:cNvSpPr>
+            <a:spLocks noGrp="1"/>
+          </p:cNvSpPr>
+          <p:nvPr>
+            <p:ph type="subTitle" idx="1"/>
+          </p:nvPr>
+        </p:nvSpPr>
+        <p:spPr/>
+        <p:txBody>
+          <a:bodyPr/>
+          <a:lstStyle/>
+          <a:p>
+            <a:endParaRPr lang="ru-RU"/>
+          </a:p>
+        </p:txBody>
+      </p:sp>
+      <p:sp>
+        <p:nvSpPr>
+          <p:cNvPr id="4" name="Text Placeholder 3">
+            <a:extLst>
+              <a:ext uri="{FF2B5EF4-FFF2-40B4-BE49-F238E27FC236}">
+                <a16:creationId xmlns:a16="http://schemas.microsoft.com/office/drawing/2014/main" id="{9A3C9ECB-54A4-4F0E-9F40-B5588C5193E6}"/>
+              </a:ext>
+            </a:extLst>
+          </p:cNvPr>
+          <p:cNvSpPr>
+            <a:spLocks noGrp="1"/>
+          </p:cNvSpPr>
+          <p:nvPr>
+            <p:ph type="body" sz="quarter" idx="11"/>
+          </p:nvPr>
+        </p:nvSpPr>
+        <p:spPr/>
+        <p:txBody>
+          <a:bodyPr/>
+          <a:lstStyle/>
+          <a:p>
+            <a:endParaRPr lang="ru-RU"/>
+          </a:p>
+        </p:txBody>
+      </p:sp>
+      <p:sp>
+        <p:nvSpPr>
+          <p:cNvPr id="5" name="Text Placeholder 4">
+            <a:extLst>
+              <a:ext uri="{FF2B5EF4-FFF2-40B4-BE49-F238E27FC236}">
+                <a16:creationId xmlns:a16="http://schemas.microsoft.com/office/drawing/2014/main" id="{F882C541-D530-436A-8CDA-C36F41425AE5}"/>
+              </a:ext>
+            </a:extLst>
+          </p:cNvPr>
+          <p:cNvSpPr>
+            <a:spLocks noGrp="1"/>
+          </p:cNvSpPr>
+          <p:nvPr>
+            <p:ph type="body" sz="quarter" idx="12"/>
+          </p:nvPr>
+        </p:nvSpPr>
+        <p:spPr/>
+        <p:txBody>
+          <a:bodyPr/>
+          <a:lstStyle/>
+          <a:p>
+            <a:endParaRPr lang="ru-RU"/>
+          </a:p>
+        </p:txBody>
+      </p:sp>
+      <p:sp>
+        <p:nvSpPr>
+          <p:cNvPr id="6" name="Text Placeholder 5">
+            <a:extLst>
+              <a:ext uri="{FF2B5EF4-FFF2-40B4-BE49-F238E27FC236}">
+                <a16:creationId xmlns:a16="http://schemas.microsoft.com/office/drawing/2014/main" id="{6D088CC4-E30E-4393-8F24-2CDD262FD5EB}"/>
+              </a:ext>
+            </a:extLst>
+          </p:cNvPr>
+          <p:cNvSpPr>
+            <a:spLocks noGrp="1"/>
+          </p:cNvSpPr>
+          <p:nvPr>
+            <p:ph type="body" sz="quarter" idx="13"/>
+          </p:nvPr>
+        </p:nvSpPr>
+        <p:spPr/>
+        <p:txBody>
+          <a:bodyPr/>
+          <a:lstStyle/>
+          <a:p>
+            <a:r>
+              <a:rPr lang="en-US" dirty="0"/>
+              <a:t>id6_placeholder</a:t>
+            </a:r>
+            <a:endParaRPr lang="ru-RU" dirty="0"/>
+          </a:p>
+        </p:txBody>
+      </p:sp>
+    </p:spTree>
+    <p:extLst>
+      <p:ext uri="{BB962C8B-B14F-4D97-AF65-F5344CB8AC3E}">
+        <p14:creationId xmlns:p14="http://schemas.microsoft.com/office/powerpoint/2010/main" val="4073234911"/>
+      </p:ext>
+    </p:extLst>
+  </p:cSld>
+  <p:clrMapOvr>
+    <a:masterClrMapping/>
+  </p:clrMapOvr>
+</p:sld>
+</file>
+
+<file path=ppt/slides/slide3.xml><?xml version="1.0" encoding="utf-8"?>
+<p:sld xmlns:a="http://schemas.openxmlformats.org/drawingml/2006/main" xmlns:r="http://schemas.openxmlformats.org/officeDocument/2006/relationships" xmlns:p="http://schemas.openxmlformats.org/presentationml/2006/main">
+  <p:cSld>
+    <p:spTree>
+      <p:nvGrpSpPr>
+        <p:cNvPr id="1" name=""/>
+        <p:cNvGrpSpPr/>
+        <p:nvPr/>
+      </p:nvGrpSpPr>
+      <p:grpSpPr>
+        <a:xfrm>
+          <a:off x="0" y="0"/>
+          <a:ext cx="0" cy="0"/>
+          <a:chOff x="0" y="0"/>
+          <a:chExt cx="0" cy="0"/>
+        </a:xfrm>
+      </p:grpSpPr>
+      <p:sp>
+        <p:nvSpPr>
+          <p:cNvPr id="2" name="Title 1">
+            <a:extLst>
+              <a:ext uri="{FF2B5EF4-FFF2-40B4-BE49-F238E27FC236}">
+                <a16:creationId xmlns:a16="http://schemas.microsoft.com/office/drawing/2014/main" id="{1121BF70-0EA3-4741-8F92-AB7E6C5A0CB2}"/>
+              </a:ext>
+            </a:extLst>
+          </p:cNvPr>
+          <p:cNvSpPr>
+            <a:spLocks noGrp="1"/>
+          </p:cNvSpPr>
+          <p:nvPr>
+            <p:ph type="ctrTitle"/>
+          </p:nvPr>
+        </p:nvSpPr>
+        <p:spPr/>
+        <p:txBody>
+          <a:bodyPr/>
+          <a:lstStyle/>
+          <a:p>
+            <a:endParaRPr lang="ru-RU"/>
+          </a:p>
+        </p:txBody>
+      </p:sp>
+      <p:sp>
+        <p:nvSpPr>
+          <p:cNvPr id="3" name="Subtitle 2">
+            <a:extLst>
+              <a:ext uri="{FF2B5EF4-FFF2-40B4-BE49-F238E27FC236}">
+                <a16:creationId xmlns:a16="http://schemas.microsoft.com/office/drawing/2014/main" id="{57FB5C33-B5CE-42A8-9421-97EDE62BAC2D}"/>
+              </a:ext>
+            </a:extLst>
+          </p:cNvPr>
+          <p:cNvSpPr>
+            <a:spLocks noGrp="1"/>
+          </p:cNvSpPr>
+          <p:nvPr>
+            <p:ph type="subTitle" idx="1"/>
+          </p:nvPr>
+        </p:nvSpPr>
+        <p:spPr/>
+        <p:txBody>
+          <a:bodyPr/>
+          <a:lstStyle/>
+          <a:p>
+            <a:endParaRPr lang="ru-RU"/>
+          </a:p>
+        </p:txBody>
+      </p:sp>
+      <p:sp>
+        <p:nvSpPr>
+          <p:cNvPr id="4" name="Text Placeholder 3">
+            <a:extLst>
+              <a:ext uri="{FF2B5EF4-FFF2-40B4-BE49-F238E27FC236}">
+                <a16:creationId xmlns:a16="http://schemas.microsoft.com/office/drawing/2014/main" id="{D41E0FBC-B607-4400-9277-1C2E0D15DD38}"/>
+              </a:ext>
+            </a:extLst>
+          </p:cNvPr>
+          <p:cNvSpPr>
+            <a:spLocks noGrp="1"/>
+          </p:cNvSpPr>
+          <p:nvPr>
+            <p:ph type="body" sz="quarter" idx="11"/>
+          </p:nvPr>
+        </p:nvSpPr>
+        <p:spPr/>
+        <p:txBody>
+          <a:bodyPr/>
+          <a:lstStyle/>
+          <a:p>
+            <a:endParaRPr lang="ru-RU"/>
+          </a:p>
+        </p:txBody>
+      </p:sp>
+      <p:sp>
+        <p:nvSpPr>
+          <p:cNvPr id="5" name="Text Placeholder 4">
+            <a:extLst>
+              <a:ext uri="{FF2B5EF4-FFF2-40B4-BE49-F238E27FC236}">
+                <a16:creationId xmlns:a16="http://schemas.microsoft.com/office/drawing/2014/main" id="{FBD16641-5EF2-476B-946B-E9FA6B202873}"/>
+              </a:ext>
+            </a:extLst>
+          </p:cNvPr>
+          <p:cNvSpPr>
+            <a:spLocks noGrp="1"/>
+          </p:cNvSpPr>
+          <p:nvPr>
+            <p:ph type="body" sz="quarter" idx="12"/>
+          </p:nvPr>
+        </p:nvSpPr>
+        <p:spPr/>
+        <p:txBody>
+          <a:bodyPr/>
+          <a:lstStyle/>
+          <a:p>
+            <a:endParaRPr lang="ru-RU"/>
+          </a:p>
+        </p:txBody>
+      </p:sp>
+      <p:sp>
+        <p:nvSpPr>
+          <p:cNvPr id="6" name="Text Placeholder 5">
+            <a:extLst>
+              <a:ext uri="{FF2B5EF4-FFF2-40B4-BE49-F238E27FC236}">
+                <a16:creationId xmlns:a16="http://schemas.microsoft.com/office/drawing/2014/main" id="{A5351A36-F086-4946-918A-08EE5AE9B222}"/>
+              </a:ext>
+            </a:extLst>
+          </p:cNvPr>
+          <p:cNvSpPr>
+            <a:spLocks noGrp="1"/>
+          </p:cNvSpPr>
+          <p:nvPr>
+            <p:ph type="body" sz="quarter" idx="13"/>
+          </p:nvPr>
+        </p:nvSpPr>
+        <p:spPr/>
+        <p:txBody>
+          <a:bodyPr/>
+          <a:lstStyle/>
+          <a:p>
+            <a:endParaRPr lang="ru-RU"/>
+          </a:p>
+        </p:txBody>
+      </p:sp>
+      <p:sp>
+        <p:nvSpPr>
+          <p:cNvPr id="7" name="Text Placeholder 6">
+            <a:extLst>
+              <a:ext uri="{FF2B5EF4-FFF2-40B4-BE49-F238E27FC236}">
+                <a16:creationId xmlns:a16="http://schemas.microsoft.com/office/drawing/2014/main" id="{F23DE72C-206E-460C-90D2-D4ACA8B9EAF5}"/>
+              </a:ext>
+            </a:extLst>
+          </p:cNvPr>
+          <p:cNvSpPr>
+            <a:spLocks noGrp="1"/>
+          </p:cNvSpPr>
+          <p:nvPr>
+            <p:ph type="body" sz="quarter" idx="14"/>
+          </p:nvPr>
+        </p:nvSpPr>
+        <p:spPr/>
+        <p:txBody>
+          <a:bodyPr/>
+          <a:lstStyle/>
+          <a:p>
+            <a:r>
+              <a:rPr lang="en-US" dirty="0"/>
+              <a:t>Id7_Placeholder_IsBoldFlase</a:t>
+            </a:r>
+            <a:endParaRPr lang="ru-RU" dirty="0"/>
+          </a:p>
+        </p:txBody>
+      </p:sp>
+    </p:spTree>
+    <p:extLst>
+      <p:ext uri="{BB962C8B-B14F-4D97-AF65-F5344CB8AC3E}">
+        <p14:creationId xmlns:p14="http://schemas.microsoft.com/office/powerpoint/2010/main" val="2391936612"/>
+      </p:ext>
+    </p:extLst>
+  </p:cSld>
+  <p:clrMapOvr>
+    <a:masterClrMapping/>
+  </p:clrMapOvr>
 </p:sld>
 </file>
 

</xml_diff>

<commit_message>
Refactor API for merging table cells (#120)
</commit_message>
<xml_diff>
--- a/ShapeCrawler.Tests.Unit/Resource/020.pptx
+++ b/ShapeCrawler.Tests.Unit/Resource/020.pptx
@@ -322,7 +322,7 @@
               <a:pPr>
                 <a:defRPr/>
               </a:pPr>
-              <a:t>16.03.2021</a:t>
+              <a:t>18.03.2021</a:t>
             </a:fld>
             <a:endParaRPr lang="ru-RU" dirty="0"/>
           </a:p>
@@ -544,7 +544,7 @@
               <a:pPr>
                 <a:defRPr/>
               </a:pPr>
-              <a:t>16.03.2021</a:t>
+              <a:t>18.03.2021</a:t>
             </a:fld>
             <a:endParaRPr lang="ru-RU" dirty="0"/>
           </a:p>
@@ -2117,7 +2117,7 @@
                   <a:schemeClr val="tx1"/>
                 </a:solidFill>
               </a:rPr>
-              <a:t>Test</a:t>
+              <a:t>Id3_Test</a:t>
             </a:r>
             <a:endParaRPr lang="ru-RU" b="1" dirty="0">
               <a:solidFill>
@@ -2535,6 +2535,49 @@
               <a:t>Id7_Placeholder_IsBoldFlase</a:t>
             </a:r>
             <a:endParaRPr lang="ru-RU" dirty="0"/>
+          </a:p>
+        </p:txBody>
+      </p:sp>
+      <p:sp>
+        <p:nvSpPr>
+          <p:cNvPr id="8" name="TextBox 7">
+            <a:extLst>
+              <a:ext uri="{FF2B5EF4-FFF2-40B4-BE49-F238E27FC236}">
+                <a16:creationId xmlns:a16="http://schemas.microsoft.com/office/drawing/2014/main" id="{BB08C90E-F21B-4AFF-8B13-469521CAD3AB}"/>
+              </a:ext>
+            </a:extLst>
+          </p:cNvPr>
+          <p:cNvSpPr txBox="1"/>
+          <p:nvPr/>
+        </p:nvSpPr>
+        <p:spPr>
+          <a:xfrm>
+            <a:off x="1151620" y="3429000"/>
+            <a:ext cx="1548172" cy="646331"/>
+          </a:xfrm>
+          <a:prstGeom prst="rect">
+            <a:avLst/>
+          </a:prstGeom>
+          <a:noFill/>
+        </p:spPr>
+        <p:txBody>
+          <a:bodyPr wrap="square" rtlCol="0">
+            <a:spAutoFit/>
+          </a:bodyPr>
+          <a:lstStyle/>
+          <a:p>
+            <a:endParaRPr lang="en-US" b="1" dirty="0"/>
+          </a:p>
+          <a:p>
+            <a:r>
+              <a:rPr lang="en-US"/>
+              <a:t>Id8_</a:t>
+            </a:r>
+            <a:r>
+              <a:rPr lang="en-US" dirty="0" err="1"/>
+              <a:t>nonPh</a:t>
+            </a:r>
+            <a:endParaRPr lang="en-US" dirty="0"/>
           </a:p>
         </p:txBody>
       </p:sp>

</xml_diff>

<commit_message>
Add IFont.IsItalic property (#121)
</commit_message>
<xml_diff>
--- a/ShapeCrawler.Tests.Unit/Resource/020.pptx
+++ b/ShapeCrawler.Tests.Unit/Resource/020.pptx
@@ -322,7 +322,7 @@
               <a:pPr>
                 <a:defRPr/>
               </a:pPr>
-              <a:t>18.03.2021</a:t>
+              <a:t>23.03.2021</a:t>
             </a:fld>
             <a:endParaRPr lang="ru-RU" dirty="0"/>
           </a:p>
@@ -544,7 +544,7 @@
               <a:pPr>
                 <a:defRPr/>
               </a:pPr>
-              <a:t>18.03.2021</a:t>
+              <a:t>23.03.2021</a:t>
             </a:fld>
             <a:endParaRPr lang="ru-RU" dirty="0"/>
           </a:p>
@@ -2112,14 +2112,14 @@
           <a:p>
             <a:pPr algn="ctr"/>
             <a:r>
-              <a:rPr lang="en-US" b="1" dirty="0">
+              <a:rPr lang="en-US" b="1" i="1" dirty="0">
                 <a:solidFill>
                   <a:schemeClr val="tx1"/>
                 </a:solidFill>
               </a:rPr>
               <a:t>Id3_Test</a:t>
             </a:r>
-            <a:endParaRPr lang="ru-RU" b="1" dirty="0">
+            <a:endParaRPr lang="ru-RU" b="1" i="1" dirty="0">
               <a:solidFill>
                 <a:schemeClr val="tx1"/>
               </a:solidFill>
@@ -2531,10 +2531,10 @@
           <a:lstStyle/>
           <a:p>
             <a:r>
-              <a:rPr lang="en-US" dirty="0"/>
+              <a:rPr lang="en-US" i="1" dirty="0"/>
               <a:t>Id7_Placeholder_IsBoldFlase</a:t>
             </a:r>
-            <a:endParaRPr lang="ru-RU" dirty="0"/>
+            <a:endParaRPr lang="ru-RU" i="1" dirty="0"/>
           </a:p>
         </p:txBody>
       </p:sp>

</xml_diff>

<commit_message>
Rename SlideSc on SCSlide (#122)
</commit_message>
<xml_diff>
--- a/ShapeCrawler.Tests.Unit/Resource/020.pptx
+++ b/ShapeCrawler.Tests.Unit/Resource/020.pptx
@@ -322,7 +322,7 @@
               <a:pPr>
                 <a:defRPr/>
               </a:pPr>
-              <a:t>23.03.2021</a:t>
+              <a:t>26.03.2021</a:t>
             </a:fld>
             <a:endParaRPr lang="ru-RU" dirty="0"/>
           </a:p>
@@ -544,7 +544,7 @@
               <a:pPr>
                 <a:defRPr/>
               </a:pPr>
-              <a:t>23.03.2021</a:t>
+              <a:t>26.03.2021</a:t>
             </a:fld>
             <a:endParaRPr lang="ru-RU" dirty="0"/>
           </a:p>
@@ -2117,7 +2117,7 @@
                   <a:schemeClr val="tx1"/>
                 </a:solidFill>
               </a:rPr>
-              <a:t>Id3_Test</a:t>
+              <a:t>Id3_nonPlaceholder</a:t>
             </a:r>
             <a:endParaRPr lang="ru-RU" b="1" i="1" dirty="0">
               <a:solidFill>
@@ -2185,8 +2185,8 @@
           <a:lstStyle/>
           <a:p>
             <a:r>
-              <a:rPr lang="en-US" dirty="0"/>
-              <a:t>id2</a:t>
+              <a:rPr lang="en-US"/>
+              <a:t>Id2_nonPh</a:t>
             </a:r>
             <a:endParaRPr lang="ru-RU" dirty="0"/>
           </a:p>

</xml_diff>

<commit_message>
Add implementation for getting font color (#124)
</commit_message>
<xml_diff>
--- a/ShapeCrawler.Tests.Unit/Resource/020.pptx
+++ b/ShapeCrawler.Tests.Unit/Resource/020.pptx
@@ -322,7 +322,7 @@
               <a:pPr>
                 <a:defRPr/>
               </a:pPr>
-              <a:t>26.03.2021</a:t>
+              <a:t>01.04.2021</a:t>
             </a:fld>
             <a:endParaRPr lang="ru-RU" dirty="0"/>
           </a:p>
@@ -544,7 +544,7 @@
               <a:pPr>
                 <a:defRPr/>
               </a:pPr>
-              <a:t>26.03.2021</a:t>
+              <a:t>01.04.2021</a:t>
             </a:fld>
             <a:endParaRPr lang="ru-RU" dirty="0"/>
           </a:p>
@@ -2570,14 +2570,13 @@
           </a:p>
           <a:p>
             <a:r>
-              <a:rPr lang="en-US"/>
-              <a:t>Id8_</a:t>
+              <a:rPr lang="en-US" dirty="0">
+                <a:solidFill>
+                  <a:srgbClr val="FFFF00"/>
+                </a:solidFill>
+              </a:rPr>
+              <a:t>Id8_nonPh</a:t>
             </a:r>
-            <a:r>
-              <a:rPr lang="en-US" dirty="0" err="1"/>
-              <a:t>nonPh</a:t>
-            </a:r>
-            <a:endParaRPr lang="en-US" dirty="0"/>
           </a:p>
         </p:txBody>
       </p:sp>

</xml_diff>